<commit_message>
Added trees & ensembles inclass, hw notebooks; updated presentation
</commit_message>
<xml_diff>
--- a/10. Desicion trees + ensembles/media/trees_ensembles_boosting.pptx
+++ b/10. Desicion trees + ensembles/media/trees_ensembles_boosting.pptx
@@ -5,7 +5,7 @@
     <p:sldMasterId id="2147483657" r:id="rId1"/>
   </p:sldMasterIdLst>
   <p:notesMasterIdLst>
-    <p:notesMasterId r:id="rId29"/>
+    <p:notesMasterId r:id="rId30"/>
   </p:notesMasterIdLst>
   <p:sldIdLst>
     <p:sldId id="256" r:id="rId2"/>
@@ -34,7 +34,8 @@
     <p:sldId id="278" r:id="rId25"/>
     <p:sldId id="279" r:id="rId26"/>
     <p:sldId id="280" r:id="rId27"/>
-    <p:sldId id="281" r:id="rId28"/>
+    <p:sldId id="283" r:id="rId28"/>
+    <p:sldId id="281" r:id="rId29"/>
   </p:sldIdLst>
   <p:sldSz cx="9144000" cy="5143500" type="screen16x9"/>
   <p:notesSz cx="6858000" cy="9144000"/>
@@ -920,14 +921,14 @@
               <a:buChar char="●"/>
             </a:pPr>
             <a:r>
-              <a:rPr lang="ru">
+              <a:rPr lang="ru" dirty="0">
                 <a:solidFill>
                   <a:schemeClr val="dk1"/>
                 </a:solidFill>
               </a:rPr>
               <a:t>количественный признак сортируется по возрастанию, и в дереве проверяются только те пороги, при которых целевой признак меняет значение. </a:t>
             </a:r>
-            <a:endParaRPr>
+            <a:endParaRPr dirty="0">
               <a:solidFill>
                 <a:schemeClr val="dk1"/>
               </a:solidFill>
@@ -951,14 +952,14 @@
               <a:buChar char="●"/>
             </a:pPr>
             <a:r>
-              <a:rPr lang="ru">
+              <a:rPr lang="ru" dirty="0">
                 <a:solidFill>
                   <a:schemeClr val="dk1"/>
                 </a:solidFill>
               </a:rPr>
               <a:t>дополнительно, когда в данных много количественных признаков, и у каждого много уникальных значений, могут отбираться не все пороги, описанные выше, а только топ-N, дающих максимальный прирост все того же критерия. </a:t>
             </a:r>
-            <a:endParaRPr>
+            <a:endParaRPr dirty="0">
               <a:solidFill>
                 <a:schemeClr val="dk1"/>
               </a:solidFill>
@@ -982,14 +983,14 @@
               <a:buChar char="●"/>
             </a:pPr>
             <a:r>
-              <a:rPr lang="ru">
+              <a:rPr lang="ru" dirty="0">
                 <a:solidFill>
                   <a:schemeClr val="dk1"/>
                 </a:solidFill>
               </a:rPr>
               <a:t>то есть, по сути, для каждого порога строится дерево глубины 1, считается насколько снизилась энтропия (или неопределенность Джини) и выбираются только лучшие пороги, с которыми стоит сравнивать количественный признак. </a:t>
             </a:r>
-            <a:endParaRPr/>
+            <a:endParaRPr dirty="0"/>
           </a:p>
         </p:txBody>
       </p:sp>
@@ -1517,14 +1518,14 @@
               <a:buChar char="●"/>
             </a:pPr>
             <a:r>
-              <a:rPr lang="ru" sz="1200">
+              <a:rPr lang="ru" sz="1200" dirty="0">
                 <a:solidFill>
                   <a:srgbClr val="222222"/>
                 </a:solidFill>
               </a:rPr>
               <a:t>Разделяющая граница, построенная деревом решений, имеет свои ограничения (состоит из гиперплоскостей, перпендикулярных какой-то из координатной оси), и на практике дерево решений по качеству классификации уступает некоторым другим методам;</a:t>
             </a:r>
-            <a:endParaRPr sz="1200">
+            <a:endParaRPr sz="1200" dirty="0">
               <a:solidFill>
                 <a:srgbClr val="222222"/>
               </a:solidFill>
@@ -1548,7 +1549,7 @@
               <a:buChar char="●"/>
             </a:pPr>
             <a:r>
-              <a:rPr lang="ru" sz="1200">
+              <a:rPr lang="ru" sz="1200" dirty="0">
                 <a:solidFill>
                   <a:srgbClr val="222222"/>
                 </a:solidFill>
@@ -1558,7 +1559,7 @@
               </a:rPr>
               <a:t>То есть дерево решений делает константный прогноз для объектов, находящихся в признаковом пространстве вне параллелепипеда, охватывающего все объекты обучающей выборки. В нашем примере с желтыми и синими шариками это значит, что модель дает одинаковый прогноз для всех шариков с координатой &gt; 19 или &lt; 0.</a:t>
             </a:r>
-            <a:endParaRPr sz="1600">
+            <a:endParaRPr sz="1600" dirty="0">
               <a:solidFill>
                 <a:srgbClr val="333333"/>
               </a:solidFill>
@@ -1582,14 +1583,14 @@
               <a:buChar char="●"/>
             </a:pPr>
             <a:r>
-              <a:rPr lang="ru" sz="1600">
+              <a:rPr lang="ru" sz="1600" dirty="0">
                 <a:solidFill>
                   <a:srgbClr val="333333"/>
                 </a:solidFill>
               </a:rPr>
               <a:t>Модель умеет только интерполировать, но не экстраполировать -- за границами рассматриваевмого множетва хз что</a:t>
             </a:r>
-            <a:endParaRPr/>
+            <a:endParaRPr dirty="0"/>
           </a:p>
         </p:txBody>
       </p:sp>
@@ -2358,7 +2359,7 @@
         </p:nvSpPr>
         <p:spPr>
           <a:xfrm>
-            <a:off x="381300" y="685800"/>
+            <a:off x="381000" y="685800"/>
             <a:ext cx="6096000" cy="3429000"/>
           </a:xfrm>
           <a:custGeom>
@@ -2670,7 +2671,7 @@
         </p:nvSpPr>
         <p:spPr>
           <a:xfrm>
-            <a:off x="381300" y="685800"/>
+            <a:off x="381000" y="685800"/>
             <a:ext cx="6096000" cy="3429000"/>
           </a:xfrm>
           <a:custGeom>
@@ -2746,6 +2747,115 @@
 </file>
 
 <file path=ppt/notesSlides/notesSlide26.xml><?xml version="1.0" encoding="utf-8"?>
+<p:notes xmlns:a="http://schemas.openxmlformats.org/drawingml/2006/main" xmlns:r="http://schemas.openxmlformats.org/officeDocument/2006/relationships" xmlns:p="http://schemas.openxmlformats.org/presentationml/2006/main" showMasterSp="0" showMasterPhAnim="0">
+  <p:cSld>
+    <p:spTree>
+      <p:nvGrpSpPr>
+        <p:cNvPr id="1" name="Shape 196"/>
+        <p:cNvGrpSpPr/>
+        <p:nvPr/>
+      </p:nvGrpSpPr>
+      <p:grpSpPr>
+        <a:xfrm>
+          <a:off x="0" y="0"/>
+          <a:ext cx="0" cy="0"/>
+          <a:chOff x="0" y="0"/>
+          <a:chExt cx="0" cy="0"/>
+        </a:xfrm>
+      </p:grpSpPr>
+      <p:sp>
+        <p:nvSpPr>
+          <p:cNvPr id="197" name="Google Shape;197;ga5a0a1daa0_0_162:notes"/>
+          <p:cNvSpPr>
+            <a:spLocks noGrp="1" noRot="1" noChangeAspect="1"/>
+          </p:cNvSpPr>
+          <p:nvPr>
+            <p:ph type="sldImg" idx="2"/>
+          </p:nvPr>
+        </p:nvSpPr>
+        <p:spPr>
+          <a:xfrm>
+            <a:off x="381000" y="685800"/>
+            <a:ext cx="6096000" cy="3429000"/>
+          </a:xfrm>
+          <a:custGeom>
+            <a:avLst/>
+            <a:gdLst/>
+            <a:ahLst/>
+            <a:cxnLst/>
+            <a:rect l="l" t="t" r="r" b="b"/>
+            <a:pathLst>
+              <a:path w="120000" h="120000" extrusionOk="0">
+                <a:moveTo>
+                  <a:pt x="0" y="0"/>
+                </a:moveTo>
+                <a:lnTo>
+                  <a:pt x="120000" y="0"/>
+                </a:lnTo>
+                <a:lnTo>
+                  <a:pt x="120000" y="120000"/>
+                </a:lnTo>
+                <a:lnTo>
+                  <a:pt x="0" y="120000"/>
+                </a:lnTo>
+                <a:close/>
+              </a:path>
+            </a:pathLst>
+          </a:custGeom>
+        </p:spPr>
+      </p:sp>
+      <p:sp>
+        <p:nvSpPr>
+          <p:cNvPr id="198" name="Google Shape;198;ga5a0a1daa0_0_162:notes"/>
+          <p:cNvSpPr txBox="1">
+            <a:spLocks noGrp="1"/>
+          </p:cNvSpPr>
+          <p:nvPr>
+            <p:ph type="body" idx="1"/>
+          </p:nvPr>
+        </p:nvSpPr>
+        <p:spPr>
+          <a:xfrm>
+            <a:off x="685800" y="4343400"/>
+            <a:ext cx="5486400" cy="4114800"/>
+          </a:xfrm>
+          <a:prstGeom prst="rect">
+            <a:avLst/>
+          </a:prstGeom>
+        </p:spPr>
+        <p:txBody>
+          <a:bodyPr spcFirstLastPara="1" wrap="square" lIns="91425" tIns="91425" rIns="91425" bIns="91425" anchor="t" anchorCtr="0">
+            <a:noAutofit/>
+          </a:bodyPr>
+          <a:lstStyle/>
+          <a:p>
+            <a:pPr marL="0" lvl="0" indent="0" algn="l" rtl="0">
+              <a:spcBef>
+                <a:spcPts val="0"/>
+              </a:spcBef>
+              <a:spcAft>
+                <a:spcPts val="0"/>
+              </a:spcAft>
+              <a:buNone/>
+            </a:pPr>
+            <a:endParaRPr/>
+          </a:p>
+        </p:txBody>
+      </p:sp>
+    </p:spTree>
+    <p:extLst>
+      <p:ext uri="{BB962C8B-B14F-4D97-AF65-F5344CB8AC3E}">
+        <p14:creationId xmlns:p14="http://schemas.microsoft.com/office/powerpoint/2010/main" val="2441608032"/>
+      </p:ext>
+    </p:extLst>
+  </p:cSld>
+  <p:clrMapOvr>
+    <a:masterClrMapping/>
+  </p:clrMapOvr>
+</p:notes>
+</file>
+
+<file path=ppt/notesSlides/notesSlide27.xml><?xml version="1.0" encoding="utf-8"?>
 <p:notes xmlns:a="http://schemas.openxmlformats.org/drawingml/2006/main" xmlns:r="http://schemas.openxmlformats.org/officeDocument/2006/relationships" xmlns:p="http://schemas.openxmlformats.org/presentationml/2006/main" showMasterSp="0" showMasterPhAnim="0">
   <p:cSld>
     <p:spTree>
@@ -2878,7 +2988,7 @@
         </p:nvSpPr>
         <p:spPr>
           <a:xfrm>
-            <a:off x="381300" y="685800"/>
+            <a:off x="381000" y="685800"/>
             <a:ext cx="6096000" cy="3429000"/>
           </a:xfrm>
           <a:custGeom>
@@ -2941,7 +3051,26 @@
               </a:spcAft>
               <a:buNone/>
             </a:pPr>
-            <a:endParaRPr/>
+            <a:r>
+              <a:rPr lang="ru-RU" dirty="0"/>
+              <a:t>Когда нам надо принять решение в какой-то жизненной ситуации, в голове мы строим что-то похожее на дерево</a:t>
+            </a:r>
+          </a:p>
+          <a:p>
+            <a:pPr marL="0" lvl="0" indent="0" algn="l" rtl="0">
+              <a:spcBef>
+                <a:spcPts val="0"/>
+              </a:spcBef>
+              <a:spcAft>
+                <a:spcPts val="0"/>
+              </a:spcAft>
+              <a:buNone/>
+            </a:pPr>
+            <a:r>
+              <a:rPr lang="ru-RU" dirty="0"/>
+              <a:t>Задаём себе какой-то вопрос; в зависимости от ответа задаём следующий вопрос; делаем так, пока не получим конечное решение</a:t>
+            </a:r>
+            <a:endParaRPr dirty="0"/>
           </a:p>
         </p:txBody>
       </p:sp>
@@ -2982,7 +3111,7 @@
         </p:nvSpPr>
         <p:spPr>
           <a:xfrm>
-            <a:off x="381300" y="685800"/>
+            <a:off x="381000" y="685800"/>
             <a:ext cx="6096000" cy="3429000"/>
           </a:xfrm>
           <a:custGeom>
@@ -3050,14 +3179,14 @@
               <a:buChar char="●"/>
             </a:pPr>
             <a:r>
-              <a:rPr lang="ru" sz="1600">
+              <a:rPr lang="ru" sz="1600" dirty="0">
                 <a:solidFill>
                   <a:srgbClr val="333333"/>
                 </a:solidFill>
               </a:rPr>
               <a:t>Игра «20 вопросов»: один человек загадывает знаменитость, а второй отгадывает, задавая только закрытые вопросы («Да» или «Нет»)</a:t>
             </a:r>
-            <a:endParaRPr sz="1600">
+            <a:endParaRPr sz="1600" dirty="0">
               <a:solidFill>
                 <a:srgbClr val="333333"/>
               </a:solidFill>
@@ -3078,14 +3207,14 @@
               <a:buChar char="●"/>
             </a:pPr>
             <a:r>
-              <a:rPr lang="ru" sz="1600">
+              <a:rPr lang="ru" sz="1600" dirty="0">
                 <a:solidFill>
                   <a:srgbClr val="333333"/>
                 </a:solidFill>
               </a:rPr>
-              <a:t>Какой вопрос отгадывающий задаст первым? Такой, который сильнее всего уменьшит количество оставшихся вариантов.</a:t>
+              <a:t>Какой вопрос отгадывающий задаст первым? Такой, который сильнее всего уменьшит количество оставшихся вариантов</a:t>
             </a:r>
-            <a:endParaRPr sz="1600">
+            <a:endParaRPr sz="1600" dirty="0">
               <a:solidFill>
                 <a:srgbClr val="333333"/>
               </a:solidFill>
@@ -3106,14 +3235,14 @@
               <a:buChar char="●"/>
             </a:pPr>
             <a:r>
-              <a:rPr lang="ru" sz="1600">
+              <a:rPr lang="ru" sz="1600" dirty="0">
                 <a:solidFill>
                   <a:srgbClr val="333333"/>
                 </a:solidFill>
               </a:rPr>
-              <a:t>Вопрос «Это Анджелина Джоли?» в случае ответа «Нет» оставит более 7 миллиардов вариантов для дальнейшего перебора.</a:t>
+              <a:t>Вопрос «Это Анджелина Джоли?» в случае ответа «Нет» оставит более 7 миллиардов вариантов для дальнейшего перебора</a:t>
             </a:r>
-            <a:endParaRPr sz="1600">
+            <a:endParaRPr sz="1600" dirty="0">
               <a:solidFill>
                 <a:srgbClr val="333333"/>
               </a:solidFill>
@@ -3134,14 +3263,14 @@
               <a:buChar char="●"/>
             </a:pPr>
             <a:r>
-              <a:rPr lang="ru" sz="1600">
+              <a:rPr lang="ru" sz="1600" dirty="0">
                 <a:solidFill>
                   <a:srgbClr val="333333"/>
                 </a:solidFill>
               </a:rPr>
-              <a:t>А вот вопрос «Это женщина?» отсечет уже около половины знаменитостей. </a:t>
+              <a:t>А вот вопрос «Это женщина?» отсечет уже около половины знаменитостей</a:t>
             </a:r>
-            <a:endParaRPr sz="1600">
+            <a:endParaRPr sz="1600" dirty="0">
               <a:solidFill>
                 <a:srgbClr val="333333"/>
               </a:solidFill>
@@ -3162,14 +3291,14 @@
               <a:buChar char="●"/>
             </a:pPr>
             <a:r>
-              <a:rPr lang="ru" sz="1600">
+              <a:rPr lang="ru" sz="1600" dirty="0">
                 <a:solidFill>
                   <a:srgbClr val="333333"/>
                 </a:solidFill>
               </a:rPr>
-              <a:t>То есть, признак «пол» намного лучше разделяет выборку людей, чем признак «это Анджелина Джоли», «национальность-испанец» или «любит футбол».</a:t>
+              <a:t>То есть, признак «пол» намного лучше разделяет выборку людей, чем признак «это Анджелина Джоли», «национальность-испанец» или «любит футбол»</a:t>
             </a:r>
-            <a:endParaRPr sz="1600">
+            <a:endParaRPr sz="1600" dirty="0">
               <a:solidFill>
                 <a:srgbClr val="333333"/>
               </a:solidFill>
@@ -3190,30 +3319,18 @@
               <a:buChar char="●"/>
             </a:pPr>
             <a:r>
-              <a:rPr lang="ru" sz="1600">
+              <a:rPr lang="ru" sz="1600" dirty="0">
                 <a:solidFill>
                   <a:srgbClr val="333333"/>
                 </a:solidFill>
               </a:rPr>
-              <a:t>Это интуитивно соответствует понятию прироста информации, основанного на энтропии.</a:t>
+              <a:t>Это интуитивно соответствует понятию прироста информации, основанного на энтропии</a:t>
             </a:r>
-            <a:endParaRPr sz="1600">
+            <a:endParaRPr sz="1600" dirty="0">
               <a:solidFill>
                 <a:srgbClr val="333333"/>
               </a:solidFill>
             </a:endParaRPr>
-          </a:p>
-          <a:p>
-            <a:pPr marL="0" lvl="0" indent="0" algn="l" rtl="0">
-              <a:spcBef>
-                <a:spcPts val="0"/>
-              </a:spcBef>
-              <a:spcAft>
-                <a:spcPts val="0"/>
-              </a:spcAft>
-              <a:buNone/>
-            </a:pPr>
-            <a:endParaRPr/>
           </a:p>
         </p:txBody>
       </p:sp>
@@ -3317,7 +3434,25 @@
               </a:spcAft>
               <a:buNone/>
             </a:pPr>
-            <a:endParaRPr dirty="0"/>
+            <a:r>
+              <a:rPr lang="ru-RU" dirty="0"/>
+              <a:t>Энтропия == хаос</a:t>
+            </a:r>
+          </a:p>
+          <a:p>
+            <a:pPr marL="0" lvl="0" indent="0" algn="l" rtl="0">
+              <a:spcBef>
+                <a:spcPts val="0"/>
+              </a:spcBef>
+              <a:spcAft>
+                <a:spcPts val="0"/>
+              </a:spcAft>
+              <a:buNone/>
+            </a:pPr>
+            <a:r>
+              <a:rPr lang="ru-RU" dirty="0"/>
+              <a:t>Чем меньше энтропия системы, тем более предсказуемо её поведение (т.к. у нас больше информации о ней)</a:t>
+            </a:r>
           </a:p>
         </p:txBody>
       </p:sp>
@@ -3421,7 +3556,7 @@
               </a:spcAft>
               <a:buNone/>
             </a:pPr>
-            <a:endParaRPr/>
+            <a:endParaRPr dirty="0"/>
           </a:p>
         </p:txBody>
       </p:sp>
@@ -3525,7 +3660,26 @@
               </a:spcAft>
               <a:buNone/>
             </a:pPr>
-            <a:endParaRPr/>
+            <a:r>
+              <a:rPr lang="ru-RU" dirty="0"/>
+              <a:t>В правой части система более предсказуема (т.к. шарики более однородны)</a:t>
+            </a:r>
+          </a:p>
+          <a:p>
+            <a:pPr marL="0" lvl="0" indent="0" algn="l" rtl="0">
+              <a:spcBef>
+                <a:spcPts val="0"/>
+              </a:spcBef>
+              <a:spcAft>
+                <a:spcPts val="0"/>
+              </a:spcAft>
+              <a:buNone/>
+            </a:pPr>
+            <a:r>
+              <a:rPr lang="ru-RU" dirty="0"/>
+              <a:t>Может ли увеличиться энтропия в подгруппе?</a:t>
+            </a:r>
+            <a:endParaRPr dirty="0"/>
           </a:p>
         </p:txBody>
       </p:sp>
@@ -3629,7 +3783,7 @@
               </a:spcAft>
               <a:buNone/>
             </a:pPr>
-            <a:endParaRPr/>
+            <a:endParaRPr dirty="0"/>
           </a:p>
         </p:txBody>
       </p:sp>
@@ -11460,177 +11614,408 @@
           <a:chExt cx="0" cy="0"/>
         </a:xfrm>
       </p:grpSpPr>
-      <p:sp>
-        <p:nvSpPr>
-          <p:cNvPr id="182" name="Google Shape;182;p32"/>
-          <p:cNvSpPr txBox="1">
-            <a:spLocks noGrp="1"/>
-          </p:cNvSpPr>
-          <p:nvPr>
-            <p:ph type="body" idx="1"/>
-          </p:nvPr>
-        </p:nvSpPr>
-        <p:spPr>
-          <a:xfrm>
-            <a:off x="270675" y="941150"/>
-            <a:ext cx="5855400" cy="839100"/>
-          </a:xfrm>
-          <a:prstGeom prst="rect">
-            <a:avLst/>
-          </a:prstGeom>
-        </p:spPr>
-        <p:txBody>
-          <a:bodyPr spcFirstLastPara="1" wrap="square" lIns="91425" tIns="91425" rIns="91425" bIns="91425" anchor="t" anchorCtr="0">
-            <a:noAutofit/>
-          </a:bodyPr>
-          <a:lstStyle/>
-          <a:p>
-            <a:pPr marL="0" lvl="0" indent="0" algn="l" rtl="0">
-              <a:spcBef>
-                <a:spcPts val="0"/>
-              </a:spcBef>
-              <a:spcAft>
-                <a:spcPts val="0"/>
-              </a:spcAft>
-              <a:buNone/>
-            </a:pPr>
-            <a:r>
-              <a:rPr lang="ru"/>
-              <a:t>Бэггинг позволяет объединить несмещенные, но чувствительные к обучающей выборке алгоритмы в несмещенную композицию с низкой дисперсией</a:t>
-            </a:r>
-            <a:endParaRPr/>
-          </a:p>
-          <a:p>
-            <a:pPr marL="457200" lvl="0" indent="-330200" algn="l" rtl="0">
-              <a:spcBef>
-                <a:spcPts val="1000"/>
-              </a:spcBef>
-              <a:spcAft>
-                <a:spcPts val="0"/>
-              </a:spcAft>
-              <a:buSzPts val="1600"/>
-              <a:buAutoNum type="arabicPeriod"/>
-            </a:pPr>
-            <a:r>
-              <a:rPr lang="ru"/>
-              <a:t>Деревья могут достигать нулевую ошибку на любой выборке (низкое смещение)</a:t>
-            </a:r>
-            <a:endParaRPr/>
-          </a:p>
-          <a:p>
-            <a:pPr marL="457200" lvl="0" indent="-330200" algn="l" rtl="0">
-              <a:spcBef>
-                <a:spcPts val="1000"/>
-              </a:spcBef>
-              <a:spcAft>
-                <a:spcPts val="0"/>
-              </a:spcAft>
-              <a:buSzPts val="1600"/>
-              <a:buAutoNum type="arabicPeriod"/>
-            </a:pPr>
-            <a:r>
-              <a:rPr lang="ru"/>
-              <a:t>Деревья легко переобучаются</a:t>
-            </a:r>
-            <a:endParaRPr/>
-          </a:p>
-          <a:p>
-            <a:pPr marL="0" lvl="0" indent="0" algn="l" rtl="0">
-              <a:spcBef>
-                <a:spcPts val="0"/>
-              </a:spcBef>
-              <a:spcAft>
-                <a:spcPts val="0"/>
-              </a:spcAft>
-              <a:buNone/>
-            </a:pPr>
-            <a:endParaRPr/>
-          </a:p>
-          <a:p>
-            <a:pPr marL="0" lvl="0" indent="0" algn="l" rtl="0">
-              <a:spcBef>
-                <a:spcPts val="0"/>
-              </a:spcBef>
-              <a:spcAft>
-                <a:spcPts val="0"/>
-              </a:spcAft>
-              <a:buNone/>
-            </a:pPr>
-            <a:r>
-              <a:rPr lang="ru"/>
-              <a:t>Делаем рандомизацию по двум направлениям</a:t>
-            </a:r>
-            <a:endParaRPr/>
-          </a:p>
-          <a:p>
-            <a:pPr marL="457200" lvl="0" indent="-330200" algn="l" rtl="0">
-              <a:spcBef>
-                <a:spcPts val="1000"/>
-              </a:spcBef>
-              <a:spcAft>
-                <a:spcPts val="0"/>
-              </a:spcAft>
-              <a:buSzPts val="1600"/>
-              <a:buAutoNum type="arabicPeriod"/>
-            </a:pPr>
-            <a:r>
-              <a:rPr lang="ru"/>
-              <a:t>Подвыборка объектов</a:t>
-            </a:r>
-            <a:endParaRPr/>
-          </a:p>
-          <a:p>
-            <a:pPr marL="457200" lvl="0" indent="-330200" algn="l" rtl="0">
-              <a:spcBef>
-                <a:spcPts val="1000"/>
-              </a:spcBef>
-              <a:spcAft>
-                <a:spcPts val="0"/>
-              </a:spcAft>
-              <a:buSzPts val="1600"/>
-              <a:buAutoNum type="arabicPeriod"/>
-            </a:pPr>
-            <a:r>
-              <a:rPr lang="ru"/>
-              <a:t>В каждой вершине разбиение ищется по подмножеству признаков</a:t>
-            </a:r>
-            <a:endParaRPr/>
-          </a:p>
-          <a:p>
-            <a:pPr marL="0" lvl="0" indent="0" algn="l" rtl="0">
-              <a:spcBef>
-                <a:spcPts val="1000"/>
-              </a:spcBef>
-              <a:spcAft>
-                <a:spcPts val="0"/>
-              </a:spcAft>
-              <a:buNone/>
-            </a:pPr>
-            <a:r>
-              <a:rPr lang="ru" sz="1000" u="sng">
-                <a:solidFill>
-                  <a:schemeClr val="hlink"/>
-                </a:solidFill>
-                <a:hlinkClick r:id="rId3"/>
-              </a:rPr>
-              <a:t>https://github.com/esokolov/ml-course-hse/blob/master/2018-fall/lecture-notes/lecture08-ensembles.pdf</a:t>
-            </a:r>
-            <a:endParaRPr sz="1000"/>
-          </a:p>
-          <a:p>
-            <a:pPr marL="0" lvl="0" indent="0" algn="l" rtl="0">
-              <a:spcBef>
-                <a:spcPts val="0"/>
-              </a:spcBef>
-              <a:spcAft>
-                <a:spcPts val="0"/>
-              </a:spcAft>
-              <a:buNone/>
-            </a:pPr>
-            <a:endParaRPr/>
-          </a:p>
-        </p:txBody>
-      </p:sp>
+      <mc:AlternateContent xmlns:mc="http://schemas.openxmlformats.org/markup-compatibility/2006">
+        <mc:Choice xmlns:a14="http://schemas.microsoft.com/office/drawing/2010/main" Requires="a14">
+          <p:sp>
+            <p:nvSpPr>
+              <p:cNvPr id="182" name="Google Shape;182;p32"/>
+              <p:cNvSpPr txBox="1">
+                <a:spLocks noGrp="1"/>
+              </p:cNvSpPr>
+              <p:nvPr>
+                <p:ph type="body" idx="1"/>
+              </p:nvPr>
+            </p:nvSpPr>
+            <p:spPr>
+              <a:xfrm>
+                <a:off x="270675" y="941150"/>
+                <a:ext cx="5855400" cy="839100"/>
+              </a:xfrm>
+              <a:prstGeom prst="rect">
+                <a:avLst/>
+              </a:prstGeom>
+            </p:spPr>
+            <p:txBody>
+              <a:bodyPr spcFirstLastPara="1" wrap="square" lIns="91425" tIns="91425" rIns="91425" bIns="91425" anchor="t" anchorCtr="0">
+                <a:noAutofit/>
+              </a:bodyPr>
+              <a:lstStyle/>
+              <a:p>
+                <a:pPr marL="0" lvl="0" indent="0" algn="l" rtl="0">
+                  <a:spcBef>
+                    <a:spcPts val="0"/>
+                  </a:spcBef>
+                  <a:spcAft>
+                    <a:spcPts val="0"/>
+                  </a:spcAft>
+                  <a:buNone/>
+                </a:pPr>
+                <a:r>
+                  <a:rPr lang="ru-RU" dirty="0"/>
+                  <a:t>Бэггинг позволяет объединить несмещенные, но чувствительные к обучающей выборке алгоритмы в несмещенную композицию с низкой дисперсией</a:t>
+                </a:r>
+              </a:p>
+              <a:p>
+                <a:pPr marL="0" lvl="0" indent="0" algn="l" rtl="0">
+                  <a:spcBef>
+                    <a:spcPts val="0"/>
+                  </a:spcBef>
+                  <a:spcAft>
+                    <a:spcPts val="0"/>
+                  </a:spcAft>
+                  <a:buNone/>
+                </a:pPr>
+                <a:endParaRPr lang="ru-RU" dirty="0"/>
+              </a:p>
+              <a:p>
+                <a:pPr marL="285750" indent="-285750"/>
+                <a:r>
+                  <a:rPr lang="ru-RU" dirty="0"/>
+                  <a:t>Деревья обладают низким смещением и высокой дисперсией предсказаний (склонны к переобучению)</a:t>
+                </a:r>
+              </a:p>
+              <a:p>
+                <a:pPr marL="285750" indent="-285750"/>
+                <a:r>
+                  <a:rPr lang="ru-RU" dirty="0"/>
+                  <a:t>Всегда хотим, чтобы данные</a:t>
+                </a:r>
+                <a:r>
+                  <a:rPr lang="en-US" dirty="0"/>
+                  <a:t> </a:t>
+                </a:r>
+                <a:r>
+                  <a:rPr lang="ru-RU" dirty="0"/>
+                  <a:t>были нормальными</a:t>
+                </a:r>
+              </a:p>
+              <a:p>
+                <a:pPr marL="742950" lvl="1" indent="-285750"/>
+                <a14:m>
+                  <m:oMath xmlns:m="http://schemas.openxmlformats.org/officeDocument/2006/math">
+                    <m:r>
+                      <a:rPr lang="en-US" i="1" smtClean="0">
+                        <a:latin typeface="Cambria Math" panose="02040503050406030204" pitchFamily="18" charset="0"/>
+                        <a:ea typeface="Cambria Math" panose="02040503050406030204" pitchFamily="18" charset="0"/>
+                      </a:rPr>
+                      <m:t>𝜇</m:t>
+                    </m:r>
+                    <m:r>
+                      <a:rPr lang="en-US" b="0" i="1" smtClean="0">
+                        <a:latin typeface="Cambria Math" panose="02040503050406030204" pitchFamily="18" charset="0"/>
+                        <a:ea typeface="Cambria Math" panose="02040503050406030204" pitchFamily="18" charset="0"/>
+                      </a:rPr>
+                      <m:t>=0,</m:t>
+                    </m:r>
+                    <m:r>
+                      <a:rPr lang="en-US" b="0" i="1" smtClean="0">
+                        <a:latin typeface="Cambria Math" panose="02040503050406030204" pitchFamily="18" charset="0"/>
+                        <a:ea typeface="Cambria Math" panose="02040503050406030204" pitchFamily="18" charset="0"/>
+                      </a:rPr>
+                      <m:t>𝜎</m:t>
+                    </m:r>
+                    <m:r>
+                      <a:rPr lang="en-US" b="0" i="1" smtClean="0">
+                        <a:latin typeface="Cambria Math" panose="02040503050406030204" pitchFamily="18" charset="0"/>
+                        <a:ea typeface="Cambria Math" panose="02040503050406030204" pitchFamily="18" charset="0"/>
+                      </a:rPr>
+                      <m:t>=1</m:t>
+                    </m:r>
+                  </m:oMath>
+                </a14:m>
+                <a:endParaRPr lang="en-US" dirty="0"/>
+              </a:p>
+              <a:p>
+                <a:pPr marL="285750" indent="-285750"/>
+                <a:r>
+                  <a:rPr lang="ru-RU" dirty="0" err="1"/>
+                  <a:t>Посэмплим</a:t>
+                </a:r>
+                <a:r>
+                  <a:rPr lang="ru-RU" dirty="0"/>
+                  <a:t> </a:t>
+                </a:r>
+                <a14:m>
+                  <m:oMath xmlns:m="http://schemas.openxmlformats.org/officeDocument/2006/math">
+                    <m:r>
+                      <a:rPr lang="en-US" i="1" dirty="0" smtClean="0">
+                        <a:latin typeface="Cambria Math" panose="02040503050406030204" pitchFamily="18" charset="0"/>
+                      </a:rPr>
+                      <m:t>𝑘</m:t>
+                    </m:r>
+                  </m:oMath>
+                </a14:m>
+                <a:r>
+                  <a:rPr lang="en-US" dirty="0"/>
+                  <a:t> </a:t>
+                </a:r>
+                <a:r>
+                  <a:rPr lang="ru-RU" dirty="0"/>
+                  <a:t>раз из </a:t>
+                </a:r>
+                <a14:m>
+                  <m:oMath xmlns:m="http://schemas.openxmlformats.org/officeDocument/2006/math">
+                    <m:r>
+                      <a:rPr lang="en-US" i="1" dirty="0" smtClean="0">
+                        <a:latin typeface="Cambria Math" panose="02040503050406030204" pitchFamily="18" charset="0"/>
+                      </a:rPr>
+                      <m:t>𝑋</m:t>
+                    </m:r>
+                  </m:oMath>
+                </a14:m>
+                <a:r>
+                  <a:rPr lang="en-US" dirty="0"/>
+                  <a:t>: </a:t>
+                </a:r>
+                <a14:m>
+                  <m:oMath xmlns:m="http://schemas.openxmlformats.org/officeDocument/2006/math">
+                    <m:d>
+                      <m:dPr>
+                        <m:begChr m:val="{"/>
+                        <m:endChr m:val="}"/>
+                        <m:ctrlPr>
+                          <a:rPr lang="en-US" b="0" i="1" smtClean="0">
+                            <a:latin typeface="Cambria Math" panose="02040503050406030204" pitchFamily="18" charset="0"/>
+                          </a:rPr>
+                        </m:ctrlPr>
+                      </m:dPr>
+                      <m:e>
+                        <m:sSub>
+                          <m:sSubPr>
+                            <m:ctrlPr>
+                              <a:rPr lang="en-US" b="0" i="1" smtClean="0">
+                                <a:latin typeface="Cambria Math" panose="02040503050406030204" pitchFamily="18" charset="0"/>
+                              </a:rPr>
+                            </m:ctrlPr>
+                          </m:sSubPr>
+                          <m:e>
+                            <m:r>
+                              <a:rPr lang="en-US" b="0" i="1" smtClean="0">
+                                <a:latin typeface="Cambria Math" panose="02040503050406030204" pitchFamily="18" charset="0"/>
+                              </a:rPr>
+                              <m:t>𝑋</m:t>
+                            </m:r>
+                          </m:e>
+                          <m:sub>
+                            <m:r>
+                              <a:rPr lang="en-US" b="0" i="1" smtClean="0">
+                                <a:latin typeface="Cambria Math" panose="02040503050406030204" pitchFamily="18" charset="0"/>
+                              </a:rPr>
+                              <m:t>1</m:t>
+                            </m:r>
+                          </m:sub>
+                        </m:sSub>
+                        <m:r>
+                          <a:rPr lang="en-US" b="0" i="1" smtClean="0">
+                            <a:latin typeface="Cambria Math" panose="02040503050406030204" pitchFamily="18" charset="0"/>
+                          </a:rPr>
+                          <m:t>,</m:t>
+                        </m:r>
+                        <m:sSub>
+                          <m:sSubPr>
+                            <m:ctrlPr>
+                              <a:rPr lang="en-US" b="0" i="1" smtClean="0">
+                                <a:latin typeface="Cambria Math" panose="02040503050406030204" pitchFamily="18" charset="0"/>
+                              </a:rPr>
+                            </m:ctrlPr>
+                          </m:sSubPr>
+                          <m:e>
+                            <m:r>
+                              <a:rPr lang="en-US" b="0" i="1" smtClean="0">
+                                <a:latin typeface="Cambria Math" panose="02040503050406030204" pitchFamily="18" charset="0"/>
+                              </a:rPr>
+                              <m:t>𝑋</m:t>
+                            </m:r>
+                          </m:e>
+                          <m:sub>
+                            <m:r>
+                              <a:rPr lang="en-US" b="0" i="1" smtClean="0">
+                                <a:latin typeface="Cambria Math" panose="02040503050406030204" pitchFamily="18" charset="0"/>
+                              </a:rPr>
+                              <m:t>2</m:t>
+                            </m:r>
+                          </m:sub>
+                        </m:sSub>
+                        <m:r>
+                          <a:rPr lang="en-US" b="0" i="1" smtClean="0">
+                            <a:latin typeface="Cambria Math" panose="02040503050406030204" pitchFamily="18" charset="0"/>
+                          </a:rPr>
+                          <m:t>,…,</m:t>
+                        </m:r>
+                        <m:sSub>
+                          <m:sSubPr>
+                            <m:ctrlPr>
+                              <a:rPr lang="en-US" b="0" i="1" smtClean="0">
+                                <a:latin typeface="Cambria Math" panose="02040503050406030204" pitchFamily="18" charset="0"/>
+                              </a:rPr>
+                            </m:ctrlPr>
+                          </m:sSubPr>
+                          <m:e>
+                            <m:r>
+                              <a:rPr lang="en-US" b="0" i="1" smtClean="0">
+                                <a:latin typeface="Cambria Math" panose="02040503050406030204" pitchFamily="18" charset="0"/>
+                              </a:rPr>
+                              <m:t>𝑋</m:t>
+                            </m:r>
+                          </m:e>
+                          <m:sub>
+                            <m:r>
+                              <a:rPr lang="en-US" b="0" i="1" smtClean="0">
+                                <a:latin typeface="Cambria Math" panose="02040503050406030204" pitchFamily="18" charset="0"/>
+                              </a:rPr>
+                              <m:t>𝑘</m:t>
+                            </m:r>
+                          </m:sub>
+                        </m:sSub>
+                      </m:e>
+                    </m:d>
+                  </m:oMath>
+                </a14:m>
+                <a:r>
+                  <a:rPr lang="ru-RU" dirty="0"/>
+                  <a:t> и усредним</a:t>
+                </a:r>
+              </a:p>
+              <a:p>
+                <a:pPr marL="742950" lvl="1" indent="-285750"/>
+                <a14:m>
+                  <m:oMath xmlns:m="http://schemas.openxmlformats.org/officeDocument/2006/math">
+                    <m:r>
+                      <a:rPr lang="ru-RU" i="1" smtClean="0">
+                        <a:latin typeface="Cambria Math" panose="02040503050406030204" pitchFamily="18" charset="0"/>
+                        <a:ea typeface="Cambria Math" panose="02040503050406030204" pitchFamily="18" charset="0"/>
+                      </a:rPr>
+                      <m:t>𝜇</m:t>
+                    </m:r>
+                  </m:oMath>
+                </a14:m>
+                <a:r>
+                  <a:rPr lang="ru-RU" dirty="0"/>
+                  <a:t> среднего распределений останется таким же</a:t>
+                </a:r>
+              </a:p>
+              <a:p>
+                <a:pPr marL="742950" lvl="1" indent="-285750"/>
+                <a14:m>
+                  <m:oMath xmlns:m="http://schemas.openxmlformats.org/officeDocument/2006/math">
+                    <m:r>
+                      <a:rPr lang="ru-RU" i="1" dirty="0" smtClean="0">
+                        <a:latin typeface="Cambria Math" panose="02040503050406030204" pitchFamily="18" charset="0"/>
+                        <a:ea typeface="Cambria Math" panose="02040503050406030204" pitchFamily="18" charset="0"/>
+                      </a:rPr>
+                      <m:t>𝜎</m:t>
+                    </m:r>
+                  </m:oMath>
+                </a14:m>
+                <a:r>
+                  <a:rPr lang="ru-RU" dirty="0"/>
+                  <a:t> среднего распределений уменьшится (</a:t>
+                </a:r>
+                <a:r>
+                  <a:rPr lang="ru-RU" dirty="0" err="1">
+                    <a:hlinkClick r:id="rId3"/>
+                  </a:rPr>
+                  <a:t>пруф</a:t>
+                </a:r>
+                <a:r>
+                  <a:rPr lang="ru-RU" dirty="0"/>
+                  <a:t>)</a:t>
+                </a:r>
+              </a:p>
+              <a:p>
+                <a:pPr marL="0" lvl="0" indent="0" algn="l" rtl="0">
+                  <a:spcBef>
+                    <a:spcPts val="1000"/>
+                  </a:spcBef>
+                  <a:spcAft>
+                    <a:spcPts val="0"/>
+                  </a:spcAft>
+                  <a:buNone/>
+                </a:pPr>
+                <a:endParaRPr lang="ru-RU" sz="1000" u="sng" dirty="0">
+                  <a:solidFill>
+                    <a:schemeClr val="hlink"/>
+                  </a:solidFill>
+                  <a:hlinkClick r:id="rId4"/>
+                </a:endParaRPr>
+              </a:p>
+              <a:p>
+                <a:pPr marL="0" lvl="0" indent="0" algn="l" rtl="0">
+                  <a:spcBef>
+                    <a:spcPts val="1000"/>
+                  </a:spcBef>
+                  <a:spcAft>
+                    <a:spcPts val="0"/>
+                  </a:spcAft>
+                  <a:buNone/>
+                </a:pPr>
+                <a:r>
+                  <a:rPr lang="en" sz="1000" u="sng" dirty="0">
+                    <a:solidFill>
+                      <a:schemeClr val="hlink"/>
+                    </a:solidFill>
+                    <a:hlinkClick r:id="rId4"/>
+                  </a:rPr>
+                  <a:t>https://github.com/esokolov/ml-course-hse/blob/master/2018-fall/lecture-notes/lecture08-ensembles.pdf</a:t>
+                </a:r>
+                <a:endParaRPr lang="en" sz="1000" dirty="0"/>
+              </a:p>
+              <a:p>
+                <a:pPr marL="0" lvl="0" indent="0" algn="l" rtl="0">
+                  <a:spcBef>
+                    <a:spcPts val="0"/>
+                  </a:spcBef>
+                  <a:spcAft>
+                    <a:spcPts val="0"/>
+                  </a:spcAft>
+                  <a:buNone/>
+                </a:pPr>
+                <a:endParaRPr dirty="0"/>
+              </a:p>
+            </p:txBody>
+          </p:sp>
+        </mc:Choice>
+        <mc:Fallback>
+          <p:sp>
+            <p:nvSpPr>
+              <p:cNvPr id="182" name="Google Shape;182;p32"/>
+              <p:cNvSpPr txBox="1">
+                <a:spLocks noGrp="1" noRot="1" noChangeAspect="1" noMove="1" noResize="1" noEditPoints="1" noAdjustHandles="1" noChangeArrowheads="1" noChangeShapeType="1" noTextEdit="1"/>
+              </p:cNvSpPr>
+              <p:nvPr>
+                <p:ph type="body" idx="1"/>
+              </p:nvPr>
+            </p:nvSpPr>
+            <p:spPr>
+              <a:xfrm>
+                <a:off x="270675" y="941150"/>
+                <a:ext cx="5855400" cy="839100"/>
+              </a:xfrm>
+              <a:prstGeom prst="rect">
+                <a:avLst/>
+              </a:prstGeom>
+              <a:blipFill>
+                <a:blip r:embed="rId5"/>
+                <a:stretch>
+                  <a:fillRect l="-649" b="-314706"/>
+                </a:stretch>
+              </a:blipFill>
+            </p:spPr>
+            <p:txBody>
+              <a:bodyPr/>
+              <a:lstStyle/>
+              <a:p>
+                <a:r>
+                  <a:rPr lang="ru-RU">
+                    <a:noFill/>
+                  </a:rPr>
+                  <a:t> </a:t>
+                </a:r>
+              </a:p>
+            </p:txBody>
+          </p:sp>
+        </mc:Fallback>
+      </mc:AlternateContent>
       <p:sp>
         <p:nvSpPr>
           <p:cNvPr id="183" name="Google Shape;183;p32"/>
@@ -11675,30 +12060,32 @@
       </p:sp>
       <p:pic>
         <p:nvPicPr>
-          <p:cNvPr id="184" name="Google Shape;184;p32"/>
-          <p:cNvPicPr preferRelativeResize="0"/>
+          <p:cNvPr id="3" name="Рисунок 2">
+            <a:extLst>
+              <a:ext uri="{FF2B5EF4-FFF2-40B4-BE49-F238E27FC236}">
+                <a16:creationId xmlns:a16="http://schemas.microsoft.com/office/drawing/2014/main" id="{42908283-8174-EB49-8A21-37F926A0B360}"/>
+              </a:ext>
+            </a:extLst>
+          </p:cNvPr>
+          <p:cNvPicPr>
+            <a:picLocks noChangeAspect="1"/>
+          </p:cNvPicPr>
           <p:nvPr/>
         </p:nvPicPr>
         <p:blipFill>
-          <a:blip r:embed="rId4">
-            <a:alphaModFix/>
-          </a:blip>
+          <a:blip r:embed="rId6"/>
           <a:stretch>
             <a:fillRect/>
           </a:stretch>
         </p:blipFill>
         <p:spPr>
           <a:xfrm>
-            <a:off x="6027375" y="531125"/>
-            <a:ext cx="3116627" cy="3058450"/>
+            <a:off x="6004692" y="1137433"/>
+            <a:ext cx="2868633" cy="2868633"/>
           </a:xfrm>
           <a:prstGeom prst="rect">
             <a:avLst/>
           </a:prstGeom>
-          <a:noFill/>
-          <a:ln>
-            <a:noFill/>
-          </a:ln>
         </p:spPr>
       </p:pic>
     </p:spTree>
@@ -11912,238 +12299,64 @@
           </a:bodyPr>
           <a:lstStyle/>
           <a:p>
-            <a:pPr marL="0" lvl="0" indent="0" algn="l" rtl="0">
-              <a:spcBef>
-                <a:spcPts val="0"/>
-              </a:spcBef>
-              <a:spcAft>
-                <a:spcPts val="0"/>
-              </a:spcAft>
-              <a:buNone/>
-            </a:pPr>
+            <a:pPr marL="285750" indent="-285750"/>
             <a:r>
-              <a:rPr lang="ru"/>
-              <a:t>Рассмотрим регрессию – хотим построить итоговый алгоритм как сумму базовых </a:t>
+              <a:rPr lang="ru" dirty="0"/>
+              <a:t>Рассмотрим линейную регрессию</a:t>
             </a:r>
-            <a:endParaRPr/>
           </a:p>
           <a:p>
-            <a:pPr marL="0" lvl="0" indent="0" algn="l" rtl="0">
-              <a:spcBef>
-                <a:spcPts val="0"/>
-              </a:spcBef>
-              <a:spcAft>
-                <a:spcPts val="0"/>
-              </a:spcAft>
-              <a:buNone/>
-            </a:pPr>
-            <a:endParaRPr/>
+            <a:pPr marL="285750" indent="-285750"/>
+            <a:r>
+              <a:rPr lang="ru" dirty="0"/>
+              <a:t>Хотим построить итоговый алгоритм как сумму базовых</a:t>
+            </a:r>
           </a:p>
           <a:p>
-            <a:pPr marL="457200" lvl="0" indent="-330200" algn="l" rtl="0">
-              <a:spcBef>
-                <a:spcPts val="0"/>
-              </a:spcBef>
-              <a:spcAft>
-                <a:spcPts val="0"/>
-              </a:spcAft>
-              <a:buSzPts val="1600"/>
+            <a:pPr marL="0" indent="0">
+              <a:buNone/>
+            </a:pPr>
+            <a:endParaRPr lang="ru" dirty="0"/>
+          </a:p>
+          <a:p>
+            <a:pPr lvl="1">
               <a:buAutoNum type="arabicPeriod"/>
             </a:pPr>
             <a:r>
-              <a:rPr lang="ru"/>
-              <a:t>Строим первый базовый алгоритм</a:t>
+              <a:rPr lang="ru" dirty="0"/>
+              <a:t>Строим первый базовый алгоритм – например, возьмё</a:t>
             </a:r>
-            <a:endParaRPr/>
+            <a:r>
+              <a:rPr lang="ru-RU" dirty="0"/>
+              <a:t>м среднее</a:t>
+            </a:r>
           </a:p>
           <a:p>
-            <a:pPr marL="457200" lvl="0" indent="-330200" algn="l" rtl="0">
-              <a:spcBef>
-                <a:spcPts val="0"/>
-              </a:spcBef>
-              <a:spcAft>
-                <a:spcPts val="0"/>
-              </a:spcAft>
-              <a:buSzPts val="1600"/>
+            <a:pPr lvl="1">
               <a:buAutoNum type="arabicPeriod"/>
             </a:pPr>
             <a:r>
-              <a:rPr lang="ru"/>
+              <a:rPr lang="ru-RU" dirty="0"/>
               <a:t>Считаем остатки – расстояния от нашего ответа до реального</a:t>
             </a:r>
-            <a:endParaRPr/>
           </a:p>
           <a:p>
-            <a:pPr marL="457200" lvl="0" indent="-330200" algn="l" rtl="0">
-              <a:spcBef>
-                <a:spcPts val="0"/>
-              </a:spcBef>
-              <a:spcAft>
-                <a:spcPts val="0"/>
-              </a:spcAft>
-              <a:buSzPts val="1600"/>
+            <a:pPr lvl="1">
               <a:buAutoNum type="arabicPeriod"/>
             </a:pPr>
             <a:r>
-              <a:rPr lang="ru"/>
+              <a:rPr lang="ru-RU" dirty="0"/>
               <a:t>Если прибавить эти остатки к ответам построенного алгоритма, то он не будет допускать ошибок на обучающей выборке</a:t>
             </a:r>
-            <a:endParaRPr/>
           </a:p>
           <a:p>
-            <a:pPr marL="457200" lvl="0" indent="-330200" algn="l" rtl="0">
-              <a:spcBef>
-                <a:spcPts val="0"/>
-              </a:spcBef>
-              <a:spcAft>
-                <a:spcPts val="0"/>
-              </a:spcAft>
-              <a:buSzPts val="1600"/>
+            <a:pPr lvl="1">
               <a:buAutoNum type="arabicPeriod"/>
             </a:pPr>
             <a:r>
-              <a:rPr lang="ru"/>
-              <a:t>Строим следующий алгоритм так, чтобы ответы были близки к остаткам</a:t>
+              <a:rPr lang="ru-RU" dirty="0"/>
+              <a:t>Каждый следующий алгоритм строим так, чтобы ответы были близки к остаткам предыдущего</a:t>
             </a:r>
-            <a:endParaRPr/>
-          </a:p>
-          <a:p>
-            <a:pPr marL="0" lvl="0" indent="0" algn="l" rtl="0">
-              <a:spcBef>
-                <a:spcPts val="0"/>
-              </a:spcBef>
-              <a:spcAft>
-                <a:spcPts val="0"/>
-              </a:spcAft>
-              <a:buNone/>
-            </a:pPr>
-            <a:endParaRPr/>
-          </a:p>
-          <a:p>
-            <a:pPr marL="0" lvl="0" indent="0" algn="l" rtl="0">
-              <a:spcBef>
-                <a:spcPts val="0"/>
-              </a:spcBef>
-              <a:spcAft>
-                <a:spcPts val="0"/>
-              </a:spcAft>
-              <a:buNone/>
-            </a:pPr>
-            <a:r>
-              <a:rPr lang="ru"/>
-              <a:t>Для сложных моделей изменения ответов делают учитывая </a:t>
-            </a:r>
-            <a:r>
-              <a:rPr lang="ru" b="1"/>
-              <a:t>градиент функции потерь</a:t>
-            </a:r>
-            <a:endParaRPr b="1"/>
-          </a:p>
-          <a:p>
-            <a:pPr marL="0" lvl="0" indent="0" algn="l" rtl="0">
-              <a:spcBef>
-                <a:spcPts val="0"/>
-              </a:spcBef>
-              <a:spcAft>
-                <a:spcPts val="0"/>
-              </a:spcAft>
-              <a:buNone/>
-            </a:pPr>
-            <a:endParaRPr/>
-          </a:p>
-          <a:p>
-            <a:pPr marL="0" lvl="0" indent="0" algn="l" rtl="0">
-              <a:spcBef>
-                <a:spcPts val="0"/>
-              </a:spcBef>
-              <a:spcAft>
-                <a:spcPts val="0"/>
-              </a:spcAft>
-              <a:buNone/>
-            </a:pPr>
-            <a:r>
-              <a:rPr lang="ru"/>
-              <a:t>Известные алгоритмы: lightGBM, xgboost, catboost</a:t>
-            </a:r>
-            <a:endParaRPr/>
-          </a:p>
-          <a:p>
-            <a:pPr marL="0" lvl="0" indent="0" algn="l" rtl="0">
-              <a:spcBef>
-                <a:spcPts val="0"/>
-              </a:spcBef>
-              <a:spcAft>
-                <a:spcPts val="0"/>
-              </a:spcAft>
-              <a:buNone/>
-            </a:pPr>
-            <a:endParaRPr/>
-          </a:p>
-          <a:p>
-            <a:pPr marL="0" lvl="0" indent="0" algn="l" rtl="0">
-              <a:spcBef>
-                <a:spcPts val="0"/>
-              </a:spcBef>
-              <a:spcAft>
-                <a:spcPts val="0"/>
-              </a:spcAft>
-              <a:buNone/>
-            </a:pPr>
-            <a:r>
-              <a:rPr lang="ru" sz="1200" u="sng">
-                <a:solidFill>
-                  <a:schemeClr val="hlink"/>
-                </a:solidFill>
-                <a:hlinkClick r:id="rId3"/>
-              </a:rPr>
-              <a:t>https://github.com/esokolov/ml-course-hse/blob/master/2018-fall/lecture-notes/lecture09-ensembles.pdf</a:t>
-            </a:r>
-            <a:endParaRPr sz="1200"/>
-          </a:p>
-          <a:p>
-            <a:pPr marL="0" lvl="0" indent="0" algn="l" rtl="0">
-              <a:spcBef>
-                <a:spcPts val="0"/>
-              </a:spcBef>
-              <a:spcAft>
-                <a:spcPts val="0"/>
-              </a:spcAft>
-              <a:buNone/>
-            </a:pPr>
-            <a:r>
-              <a:rPr lang="ru" sz="1200" u="sng">
-                <a:solidFill>
-                  <a:schemeClr val="hlink"/>
-                </a:solidFill>
-                <a:hlinkClick r:id="rId4"/>
-              </a:rPr>
-              <a:t>https://towardsdatascience.com/catboost-vs-light-gbm-vs-xgboost-5f93620723db</a:t>
-            </a:r>
-            <a:endParaRPr sz="1200"/>
-          </a:p>
-          <a:p>
-            <a:pPr marL="0" lvl="0" indent="0" algn="l" rtl="0">
-              <a:spcBef>
-                <a:spcPts val="0"/>
-              </a:spcBef>
-              <a:spcAft>
-                <a:spcPts val="0"/>
-              </a:spcAft>
-              <a:buNone/>
-            </a:pPr>
-            <a:endParaRPr sz="1200"/>
-          </a:p>
-          <a:p>
-            <a:pPr marL="0" lvl="0" indent="0" algn="l" rtl="0">
-              <a:spcBef>
-                <a:spcPts val="0"/>
-              </a:spcBef>
-              <a:spcAft>
-                <a:spcPts val="0"/>
-              </a:spcAft>
-              <a:buNone/>
-            </a:pPr>
-            <a:endParaRPr/>
           </a:p>
         </p:txBody>
       </p:sp>
@@ -12182,10 +12395,14 @@
               <a:buNone/>
             </a:pPr>
             <a:r>
-              <a:rPr lang="ru"/>
-              <a:t>Градиентный бустинг</a:t>
+              <a:rPr lang="ru-RU" dirty="0"/>
+              <a:t>Б</a:t>
             </a:r>
-            <a:endParaRPr/>
+            <a:r>
+              <a:rPr lang="ru" dirty="0"/>
+              <a:t>устинг</a:t>
+            </a:r>
+            <a:endParaRPr dirty="0"/>
           </a:p>
         </p:txBody>
       </p:sp>
@@ -12198,6 +12415,285 @@
 </file>
 
 <file path=ppt/slides/slide27.xml><?xml version="1.0" encoding="utf-8"?>
+<p:sld xmlns:a="http://schemas.openxmlformats.org/drawingml/2006/main" xmlns:r="http://schemas.openxmlformats.org/officeDocument/2006/relationships" xmlns:p="http://schemas.openxmlformats.org/presentationml/2006/main">
+  <p:cSld>
+    <p:spTree>
+      <p:nvGrpSpPr>
+        <p:cNvPr id="1" name="Shape 199"/>
+        <p:cNvGrpSpPr/>
+        <p:nvPr/>
+      </p:nvGrpSpPr>
+      <p:grpSpPr>
+        <a:xfrm>
+          <a:off x="0" y="0"/>
+          <a:ext cx="0" cy="0"/>
+          <a:chOff x="0" y="0"/>
+          <a:chExt cx="0" cy="0"/>
+        </a:xfrm>
+      </p:grpSpPr>
+      <p:sp>
+        <p:nvSpPr>
+          <p:cNvPr id="200" name="Google Shape;200;p35"/>
+          <p:cNvSpPr txBox="1">
+            <a:spLocks noGrp="1"/>
+          </p:cNvSpPr>
+          <p:nvPr>
+            <p:ph type="body" idx="1"/>
+          </p:nvPr>
+        </p:nvSpPr>
+        <p:spPr>
+          <a:xfrm>
+            <a:off x="270675" y="941150"/>
+            <a:ext cx="8393100" cy="839100"/>
+          </a:xfrm>
+          <a:prstGeom prst="rect">
+            <a:avLst/>
+          </a:prstGeom>
+        </p:spPr>
+        <p:txBody>
+          <a:bodyPr spcFirstLastPara="1" wrap="square" lIns="91425" tIns="91425" rIns="91425" bIns="91425" anchor="t" anchorCtr="0">
+            <a:noAutofit/>
+          </a:bodyPr>
+          <a:lstStyle/>
+          <a:p>
+            <a:pPr marL="285750" indent="-285750"/>
+            <a:r>
+              <a:rPr lang="ru" dirty="0"/>
+              <a:t>Теперь рассмотрим задачу классификации</a:t>
+            </a:r>
+          </a:p>
+          <a:p>
+            <a:pPr marL="285750" indent="-285750"/>
+            <a:r>
+              <a:rPr lang="ru" dirty="0"/>
+              <a:t>В качестве базовой модели возьмём логрег</a:t>
+            </a:r>
+          </a:p>
+          <a:p>
+            <a:pPr marL="285750" indent="-285750"/>
+            <a:r>
+              <a:rPr lang="ru" dirty="0"/>
+              <a:t>Мы не можем обучать базовые модели напрямую на разнице предсказаний</a:t>
+            </a:r>
+          </a:p>
+          <a:p>
+            <a:pPr marL="285750" indent="-285750"/>
+            <a:r>
+              <a:rPr lang="ru" dirty="0"/>
+              <a:t>Введём </a:t>
+            </a:r>
+            <a:r>
+              <a:rPr lang="ru-RU" dirty="0"/>
+              <a:t>логистическую функцию потерь</a:t>
+            </a:r>
+          </a:p>
+          <a:p>
+            <a:pPr marL="742950" lvl="1" indent="-285750"/>
+            <a:r>
+              <a:rPr lang="ru-RU" dirty="0"/>
+              <a:t>Оптимизировать её напрямую на остатках тоже не получится</a:t>
+            </a:r>
+          </a:p>
+          <a:p>
+            <a:pPr marL="285750" indent="-285750"/>
+            <a:r>
+              <a:rPr lang="ru-RU" dirty="0"/>
+              <a:t>Тогда будем во время обучения базовых моделей учитывать </a:t>
+            </a:r>
+            <a:r>
+              <a:rPr lang="ru-RU" b="1" dirty="0"/>
+              <a:t>градиент функции потерь</a:t>
+            </a:r>
+            <a:endParaRPr lang="ru" dirty="0"/>
+          </a:p>
+          <a:p>
+            <a:pPr marL="0" lvl="0" indent="0" algn="l" rtl="0">
+              <a:spcBef>
+                <a:spcPts val="0"/>
+              </a:spcBef>
+              <a:spcAft>
+                <a:spcPts val="0"/>
+              </a:spcAft>
+              <a:buNone/>
+            </a:pPr>
+            <a:endParaRPr dirty="0"/>
+          </a:p>
+          <a:p>
+            <a:pPr marL="0" lvl="0" indent="0" algn="l" rtl="0">
+              <a:spcBef>
+                <a:spcPts val="0"/>
+              </a:spcBef>
+              <a:spcAft>
+                <a:spcPts val="0"/>
+              </a:spcAft>
+              <a:buNone/>
+            </a:pPr>
+            <a:r>
+              <a:rPr lang="ru" dirty="0"/>
+              <a:t>Известные алгоритмы: lightGBM, xgboost, catboost</a:t>
+            </a:r>
+            <a:endParaRPr dirty="0"/>
+          </a:p>
+          <a:p>
+            <a:pPr marL="0" lvl="0" indent="0" algn="l" rtl="0">
+              <a:spcBef>
+                <a:spcPts val="0"/>
+              </a:spcBef>
+              <a:spcAft>
+                <a:spcPts val="0"/>
+              </a:spcAft>
+              <a:buNone/>
+            </a:pPr>
+            <a:endParaRPr lang="ru-RU" dirty="0"/>
+          </a:p>
+          <a:p>
+            <a:pPr marL="0" lvl="0" indent="0" algn="l" rtl="0">
+              <a:spcBef>
+                <a:spcPts val="0"/>
+              </a:spcBef>
+              <a:spcAft>
+                <a:spcPts val="0"/>
+              </a:spcAft>
+              <a:buNone/>
+            </a:pPr>
+            <a:endParaRPr lang="ru-RU" dirty="0"/>
+          </a:p>
+          <a:p>
+            <a:pPr marL="0" lvl="0" indent="0" algn="l" rtl="0">
+              <a:spcBef>
+                <a:spcPts val="0"/>
+              </a:spcBef>
+              <a:spcAft>
+                <a:spcPts val="0"/>
+              </a:spcAft>
+              <a:buNone/>
+            </a:pPr>
+            <a:endParaRPr dirty="0"/>
+          </a:p>
+          <a:p>
+            <a:pPr marL="0" lvl="0" indent="0" algn="l" rtl="0">
+              <a:spcBef>
+                <a:spcPts val="0"/>
+              </a:spcBef>
+              <a:spcAft>
+                <a:spcPts val="0"/>
+              </a:spcAft>
+              <a:buNone/>
+            </a:pPr>
+            <a:r>
+              <a:rPr lang="ru" sz="1200" u="sng" dirty="0">
+                <a:solidFill>
+                  <a:schemeClr val="hlink"/>
+                </a:solidFill>
+                <a:hlinkClick r:id="rId3"/>
+              </a:rPr>
+              <a:t>https://github.com/esokolov/ml-course-hse/blob/master/2018-fall/lecture-notes/lecture09-ensembles.pdf</a:t>
+            </a:r>
+            <a:endParaRPr sz="1200" dirty="0"/>
+          </a:p>
+          <a:p>
+            <a:pPr marL="0" lvl="0" indent="0" algn="l" rtl="0">
+              <a:spcBef>
+                <a:spcPts val="0"/>
+              </a:spcBef>
+              <a:spcAft>
+                <a:spcPts val="0"/>
+              </a:spcAft>
+              <a:buNone/>
+            </a:pPr>
+            <a:r>
+              <a:rPr lang="ru" sz="1200" u="sng" dirty="0">
+                <a:solidFill>
+                  <a:schemeClr val="hlink"/>
+                </a:solidFill>
+                <a:hlinkClick r:id="rId4"/>
+              </a:rPr>
+              <a:t>https://towardsdatascience.com/catboost-vs-light-gbm-vs-xgboost-5f93620723db</a:t>
+            </a:r>
+            <a:endParaRPr sz="1200" dirty="0"/>
+          </a:p>
+          <a:p>
+            <a:pPr marL="0" lvl="0" indent="0" algn="l" rtl="0">
+              <a:spcBef>
+                <a:spcPts val="0"/>
+              </a:spcBef>
+              <a:spcAft>
+                <a:spcPts val="0"/>
+              </a:spcAft>
+              <a:buNone/>
+            </a:pPr>
+            <a:endParaRPr sz="1200" dirty="0"/>
+          </a:p>
+          <a:p>
+            <a:pPr marL="0" lvl="0" indent="0" algn="l" rtl="0">
+              <a:spcBef>
+                <a:spcPts val="0"/>
+              </a:spcBef>
+              <a:spcAft>
+                <a:spcPts val="0"/>
+              </a:spcAft>
+              <a:buNone/>
+            </a:pPr>
+            <a:endParaRPr dirty="0"/>
+          </a:p>
+        </p:txBody>
+      </p:sp>
+      <p:sp>
+        <p:nvSpPr>
+          <p:cNvPr id="201" name="Google Shape;201;p35"/>
+          <p:cNvSpPr txBox="1">
+            <a:spLocks noGrp="1"/>
+          </p:cNvSpPr>
+          <p:nvPr>
+            <p:ph type="title"/>
+          </p:nvPr>
+        </p:nvSpPr>
+        <p:spPr>
+          <a:xfrm>
+            <a:off x="261150" y="283850"/>
+            <a:ext cx="8332200" cy="771600"/>
+          </a:xfrm>
+          <a:prstGeom prst="rect">
+            <a:avLst/>
+          </a:prstGeom>
+        </p:spPr>
+        <p:txBody>
+          <a:bodyPr spcFirstLastPara="1" wrap="square" lIns="91425" tIns="91425" rIns="91425" bIns="91425" anchor="t" anchorCtr="0">
+            <a:noAutofit/>
+          </a:bodyPr>
+          <a:lstStyle/>
+          <a:p>
+            <a:pPr marL="0" lvl="0" indent="0" algn="l" rtl="0">
+              <a:spcBef>
+                <a:spcPts val="0"/>
+              </a:spcBef>
+              <a:spcAft>
+                <a:spcPts val="0"/>
+              </a:spcAft>
+              <a:buNone/>
+            </a:pPr>
+            <a:r>
+              <a:rPr lang="ru"/>
+              <a:t>Градиентный бустинг</a:t>
+            </a:r>
+            <a:endParaRPr/>
+          </a:p>
+        </p:txBody>
+      </p:sp>
+    </p:spTree>
+    <p:extLst>
+      <p:ext uri="{BB962C8B-B14F-4D97-AF65-F5344CB8AC3E}">
+        <p14:creationId xmlns:p14="http://schemas.microsoft.com/office/powerpoint/2010/main" val="2661445469"/>
+      </p:ext>
+    </p:extLst>
+  </p:cSld>
+  <p:clrMapOvr>
+    <a:masterClrMapping/>
+  </p:clrMapOvr>
+</p:sld>
+</file>
+
+<file path=ppt/slides/slide28.xml><?xml version="1.0" encoding="utf-8"?>
 <p:sld xmlns:a="http://schemas.openxmlformats.org/drawingml/2006/main" xmlns:r="http://schemas.openxmlformats.org/officeDocument/2006/relationships" xmlns:p="http://schemas.openxmlformats.org/presentationml/2006/main">
   <p:cSld>
     <p:spTree>
@@ -12630,8 +13126,8 @@
           <a:chExt cx="0" cy="0"/>
         </a:xfrm>
       </p:grpSpPr>
-      <mc:AlternateContent xmlns:mc="http://schemas.openxmlformats.org/markup-compatibility/2006">
-        <mc:Choice xmlns:a14="http://schemas.microsoft.com/office/drawing/2010/main" Requires="a14">
+      <mc:AlternateContent xmlns:mc="http://schemas.openxmlformats.org/markup-compatibility/2006" xmlns:a14="http://schemas.microsoft.com/office/drawing/2010/main">
+        <mc:Choice Requires="a14">
           <p:sp>
             <p:nvSpPr>
               <p:cNvPr id="72" name="Google Shape;72;p15"/>
@@ -13042,7 +13538,7 @@
             </p:txBody>
           </p:sp>
         </mc:Choice>
-        <mc:Fallback>
+        <mc:Fallback xmlns="">
           <p:sp>
             <p:nvSpPr>
               <p:cNvPr id="72" name="Google Shape;72;p15"/>
@@ -13150,8 +13646,8 @@
           <a:chExt cx="0" cy="0"/>
         </a:xfrm>
       </p:grpSpPr>
-      <mc:AlternateContent xmlns:mc="http://schemas.openxmlformats.org/markup-compatibility/2006">
-        <mc:Choice xmlns:a14="http://schemas.microsoft.com/office/drawing/2010/main" Requires="a14">
+      <mc:AlternateContent xmlns:mc="http://schemas.openxmlformats.org/markup-compatibility/2006" xmlns:a14="http://schemas.microsoft.com/office/drawing/2010/main">
+        <mc:Choice Requires="a14">
           <p:sp>
             <p:nvSpPr>
               <p:cNvPr id="79" name="Google Shape;79;p16"/>
@@ -13794,7 +14290,7 @@
             </p:txBody>
           </p:sp>
         </mc:Choice>
-        <mc:Fallback>
+        <mc:Fallback xmlns="">
           <p:sp>
             <p:nvSpPr>
               <p:cNvPr id="79" name="Google Shape;79;p16"/>
@@ -14911,10 +15407,10 @@
               <a:buNone/>
             </a:pPr>
             <a:r>
-              <a:rPr lang="ru"/>
+              <a:rPr lang="ru" dirty="0"/>
               <a:t>Как видим, энтропия уменьшилась в обеих группах по сравнению с начальным состоянием, хоть в левой и не сильно. </a:t>
             </a:r>
-            <a:endParaRPr/>
+            <a:endParaRPr dirty="0"/>
           </a:p>
         </p:txBody>
       </p:sp>

</xml_diff>